<commit_message>
fix the root nodes
</commit_message>
<xml_diff>
--- a/19/docs/LeetCode #19 Design Spec.pptx
+++ b/19/docs/LeetCode #19 Design Spec.pptx
@@ -106,6 +106,11 @@
       </a:defRPr>
     </a:lvl9pPr>
   </p:defaultTextStyle>
+  <p:extLst>
+    <p:ext uri="{EFAFB233-063F-42B5-8137-9DF3F51BA10A}">
+      <p15:sldGuideLst xmlns:p15="http://schemas.microsoft.com/office/powerpoint/2012/main"/>
+    </p:ext>
+  </p:extLst>
 </p:presentation>
 </file>
 
@@ -256,7 +261,7 @@
           <a:p>
             <a:fld id="{0A339302-206F-4DB2-A2B9-E1DB2E0766B9}" type="datetimeFigureOut">
               <a:rPr lang="en-US" smtClean="0"/>
-              <a:t>6/27/2021</a:t>
+              <a:t>6/28/2021</a:t>
             </a:fld>
             <a:endParaRPr lang="en-US"/>
           </a:p>
@@ -454,7 +459,7 @@
           <a:p>
             <a:fld id="{0A339302-206F-4DB2-A2B9-E1DB2E0766B9}" type="datetimeFigureOut">
               <a:rPr lang="en-US" smtClean="0"/>
-              <a:t>6/27/2021</a:t>
+              <a:t>6/28/2021</a:t>
             </a:fld>
             <a:endParaRPr lang="en-US"/>
           </a:p>
@@ -662,7 +667,7 @@
           <a:p>
             <a:fld id="{0A339302-206F-4DB2-A2B9-E1DB2E0766B9}" type="datetimeFigureOut">
               <a:rPr lang="en-US" smtClean="0"/>
-              <a:t>6/27/2021</a:t>
+              <a:t>6/28/2021</a:t>
             </a:fld>
             <a:endParaRPr lang="en-US"/>
           </a:p>
@@ -860,7 +865,7 @@
           <a:p>
             <a:fld id="{0A339302-206F-4DB2-A2B9-E1DB2E0766B9}" type="datetimeFigureOut">
               <a:rPr lang="en-US" smtClean="0"/>
-              <a:t>6/27/2021</a:t>
+              <a:t>6/28/2021</a:t>
             </a:fld>
             <a:endParaRPr lang="en-US"/>
           </a:p>
@@ -1135,7 +1140,7 @@
           <a:p>
             <a:fld id="{0A339302-206F-4DB2-A2B9-E1DB2E0766B9}" type="datetimeFigureOut">
               <a:rPr lang="en-US" smtClean="0"/>
-              <a:t>6/27/2021</a:t>
+              <a:t>6/28/2021</a:t>
             </a:fld>
             <a:endParaRPr lang="en-US"/>
           </a:p>
@@ -1400,7 +1405,7 @@
           <a:p>
             <a:fld id="{0A339302-206F-4DB2-A2B9-E1DB2E0766B9}" type="datetimeFigureOut">
               <a:rPr lang="en-US" smtClean="0"/>
-              <a:t>6/27/2021</a:t>
+              <a:t>6/28/2021</a:t>
             </a:fld>
             <a:endParaRPr lang="en-US"/>
           </a:p>
@@ -1812,7 +1817,7 @@
           <a:p>
             <a:fld id="{0A339302-206F-4DB2-A2B9-E1DB2E0766B9}" type="datetimeFigureOut">
               <a:rPr lang="en-US" smtClean="0"/>
-              <a:t>6/27/2021</a:t>
+              <a:t>6/28/2021</a:t>
             </a:fld>
             <a:endParaRPr lang="en-US"/>
           </a:p>
@@ -1953,7 +1958,7 @@
           <a:p>
             <a:fld id="{0A339302-206F-4DB2-A2B9-E1DB2E0766B9}" type="datetimeFigureOut">
               <a:rPr lang="en-US" smtClean="0"/>
-              <a:t>6/27/2021</a:t>
+              <a:t>6/28/2021</a:t>
             </a:fld>
             <a:endParaRPr lang="en-US"/>
           </a:p>
@@ -2066,7 +2071,7 @@
           <a:p>
             <a:fld id="{0A339302-206F-4DB2-A2B9-E1DB2E0766B9}" type="datetimeFigureOut">
               <a:rPr lang="en-US" smtClean="0"/>
-              <a:t>6/27/2021</a:t>
+              <a:t>6/28/2021</a:t>
             </a:fld>
             <a:endParaRPr lang="en-US"/>
           </a:p>
@@ -2377,7 +2382,7 @@
           <a:p>
             <a:fld id="{0A339302-206F-4DB2-A2B9-E1DB2E0766B9}" type="datetimeFigureOut">
               <a:rPr lang="en-US" smtClean="0"/>
-              <a:t>6/27/2021</a:t>
+              <a:t>6/28/2021</a:t>
             </a:fld>
             <a:endParaRPr lang="en-US"/>
           </a:p>
@@ -2665,7 +2670,7 @@
           <a:p>
             <a:fld id="{0A339302-206F-4DB2-A2B9-E1DB2E0766B9}" type="datetimeFigureOut">
               <a:rPr lang="en-US" smtClean="0"/>
-              <a:t>6/27/2021</a:t>
+              <a:t>6/28/2021</a:t>
             </a:fld>
             <a:endParaRPr lang="en-US"/>
           </a:p>
@@ -2906,7 +2911,7 @@
           <a:p>
             <a:fld id="{0A339302-206F-4DB2-A2B9-E1DB2E0766B9}" type="datetimeFigureOut">
               <a:rPr lang="en-US" smtClean="0"/>
-              <a:t>6/27/2021</a:t>
+              <a:t>6/28/2021</a:t>
             </a:fld>
             <a:endParaRPr lang="en-US"/>
           </a:p>
@@ -8233,6 +8238,198 @@
           </a:p>
         </p:txBody>
       </p:sp>
+      <p:sp>
+        <p:nvSpPr>
+          <p:cNvPr id="80" name="Rectangle 79">
+            <a:extLst>
+              <a:ext uri="{FF2B5EF4-FFF2-40B4-BE49-F238E27FC236}">
+                <a16:creationId xmlns:a16="http://schemas.microsoft.com/office/drawing/2014/main" id="{DB2810FF-A703-4667-9285-50182C1804C5}"/>
+              </a:ext>
+            </a:extLst>
+          </p:cNvPr>
+          <p:cNvSpPr/>
+          <p:nvPr/>
+        </p:nvSpPr>
+        <p:spPr>
+          <a:xfrm>
+            <a:off x="1237939" y="2598737"/>
+            <a:ext cx="914400" cy="914400"/>
+          </a:xfrm>
+          <a:prstGeom prst="rect">
+            <a:avLst/>
+          </a:prstGeom>
+        </p:spPr>
+        <p:style>
+          <a:lnRef idx="2">
+            <a:schemeClr val="accent5">
+              <a:shade val="50000"/>
+            </a:schemeClr>
+          </a:lnRef>
+          <a:fillRef idx="1">
+            <a:schemeClr val="accent5"/>
+          </a:fillRef>
+          <a:effectRef idx="0">
+            <a:schemeClr val="accent5"/>
+          </a:effectRef>
+          <a:fontRef idx="minor">
+            <a:schemeClr val="lt1"/>
+          </a:fontRef>
+        </p:style>
+        <p:txBody>
+          <a:bodyPr rtlCol="0" anchor="ctr"/>
+          <a:lstStyle/>
+          <a:p>
+            <a:pPr algn="ctr"/>
+            <a:r>
+              <a:rPr lang="en-US" sz="3200" dirty="0"/>
+              <a:t>root</a:t>
+            </a:r>
+          </a:p>
+        </p:txBody>
+      </p:sp>
+      <p:cxnSp>
+        <p:nvCxnSpPr>
+          <p:cNvPr id="81" name="Straight Connector 80">
+            <a:extLst>
+              <a:ext uri="{FF2B5EF4-FFF2-40B4-BE49-F238E27FC236}">
+                <a16:creationId xmlns:a16="http://schemas.microsoft.com/office/drawing/2014/main" id="{C958CDC4-D614-4018-B668-2F3F6D959E31}"/>
+              </a:ext>
+            </a:extLst>
+          </p:cNvPr>
+          <p:cNvCxnSpPr>
+            <a:cxnSpLocks/>
+            <a:stCxn id="80" idx="3"/>
+            <a:endCxn id="38" idx="1"/>
+          </p:cNvCxnSpPr>
+          <p:nvPr/>
+        </p:nvCxnSpPr>
+        <p:spPr>
+          <a:xfrm>
+            <a:off x="2152339" y="3055937"/>
+            <a:ext cx="543945" cy="0"/>
+          </a:xfrm>
+          <a:prstGeom prst="line">
+            <a:avLst/>
+          </a:prstGeom>
+          <a:ln w="28575">
+            <a:solidFill>
+              <a:schemeClr val="accent5"/>
+            </a:solidFill>
+            <a:headEnd type="none" w="med" len="med"/>
+            <a:tailEnd type="triangle" w="lg" len="lg"/>
+          </a:ln>
+        </p:spPr>
+        <p:style>
+          <a:lnRef idx="1">
+            <a:schemeClr val="accent1"/>
+          </a:lnRef>
+          <a:fillRef idx="0">
+            <a:schemeClr val="accent1"/>
+          </a:fillRef>
+          <a:effectRef idx="0">
+            <a:schemeClr val="accent1"/>
+          </a:effectRef>
+          <a:fontRef idx="minor">
+            <a:schemeClr val="tx1"/>
+          </a:fontRef>
+        </p:style>
+      </p:cxnSp>
+      <p:sp>
+        <p:nvSpPr>
+          <p:cNvPr id="82" name="Rectangle 81">
+            <a:extLst>
+              <a:ext uri="{FF2B5EF4-FFF2-40B4-BE49-F238E27FC236}">
+                <a16:creationId xmlns:a16="http://schemas.microsoft.com/office/drawing/2014/main" id="{3697A6ED-0EEF-4965-B1F3-4E2D82C99FBE}"/>
+              </a:ext>
+            </a:extLst>
+          </p:cNvPr>
+          <p:cNvSpPr/>
+          <p:nvPr/>
+        </p:nvSpPr>
+        <p:spPr>
+          <a:xfrm>
+            <a:off x="1237011" y="4669655"/>
+            <a:ext cx="914400" cy="914400"/>
+          </a:xfrm>
+          <a:prstGeom prst="rect">
+            <a:avLst/>
+          </a:prstGeom>
+        </p:spPr>
+        <p:style>
+          <a:lnRef idx="2">
+            <a:schemeClr val="accent5">
+              <a:shade val="50000"/>
+            </a:schemeClr>
+          </a:lnRef>
+          <a:fillRef idx="1">
+            <a:schemeClr val="accent5"/>
+          </a:fillRef>
+          <a:effectRef idx="0">
+            <a:schemeClr val="accent5"/>
+          </a:effectRef>
+          <a:fontRef idx="minor">
+            <a:schemeClr val="lt1"/>
+          </a:fontRef>
+        </p:style>
+        <p:txBody>
+          <a:bodyPr rtlCol="0" anchor="ctr"/>
+          <a:lstStyle/>
+          <a:p>
+            <a:pPr algn="ctr"/>
+            <a:r>
+              <a:rPr lang="en-US" sz="3200" dirty="0"/>
+              <a:t>root</a:t>
+            </a:r>
+          </a:p>
+        </p:txBody>
+      </p:sp>
+      <p:cxnSp>
+        <p:nvCxnSpPr>
+          <p:cNvPr id="83" name="Straight Connector 82">
+            <a:extLst>
+              <a:ext uri="{FF2B5EF4-FFF2-40B4-BE49-F238E27FC236}">
+                <a16:creationId xmlns:a16="http://schemas.microsoft.com/office/drawing/2014/main" id="{6466909F-8537-43E2-BC27-92F86E8466BB}"/>
+              </a:ext>
+            </a:extLst>
+          </p:cNvPr>
+          <p:cNvCxnSpPr>
+            <a:cxnSpLocks/>
+            <a:stCxn id="82" idx="3"/>
+            <a:endCxn id="5" idx="1"/>
+          </p:cNvCxnSpPr>
+          <p:nvPr/>
+        </p:nvCxnSpPr>
+        <p:spPr>
+          <a:xfrm>
+            <a:off x="2151411" y="5126855"/>
+            <a:ext cx="538523" cy="0"/>
+          </a:xfrm>
+          <a:prstGeom prst="line">
+            <a:avLst/>
+          </a:prstGeom>
+          <a:ln w="28575">
+            <a:solidFill>
+              <a:schemeClr val="accent5"/>
+            </a:solidFill>
+            <a:headEnd type="none" w="med" len="med"/>
+            <a:tailEnd type="triangle" w="lg" len="lg"/>
+          </a:ln>
+        </p:spPr>
+        <p:style>
+          <a:lnRef idx="1">
+            <a:schemeClr val="accent1"/>
+          </a:lnRef>
+          <a:fillRef idx="0">
+            <a:schemeClr val="accent1"/>
+          </a:fillRef>
+          <a:effectRef idx="0">
+            <a:schemeClr val="accent1"/>
+          </a:effectRef>
+          <a:fontRef idx="minor">
+            <a:schemeClr val="tx1"/>
+          </a:fontRef>
+        </p:style>
+      </p:cxnSp>
     </p:spTree>
     <p:extLst>
       <p:ext uri="{BB962C8B-B14F-4D97-AF65-F5344CB8AC3E}">

</xml_diff>